<commit_message>
adding links, AmiGO, and fixing principle mis-pastes
git-svn-id: http://nescent-anatomy-course.googlecode.com/svn/trunk/2013_course@226 586f635c-ba50-3696-6e8c-0f279cf0028a
</commit_message>
<xml_diff>
--- a/material_for_course/mon/BestPractices.pptx
+++ b/material_for_course/mon/BestPractices.pptx
@@ -223,7 +223,7 @@
           <a:p>
             <a:fld id="{63BB1AC2-FB72-3840-8ED2-90B75CFA8FEC}" type="datetimeFigureOut">
               <a:rPr lang="en-US" smtClean="0"/>
-              <a:t>7/28/13</a:t>
+              <a:t>7/29/13</a:t>
             </a:fld>
             <a:endParaRPr lang="en-US"/>
           </a:p>
@@ -1350,7 +1350,7 @@
           <a:p>
             <a:fld id="{0EB034E8-5B5B-884E-9F8F-38FACABF36E5}" type="datetimeFigureOut">
               <a:rPr lang="en-US" smtClean="0"/>
-              <a:t>7/28/13</a:t>
+              <a:t>7/29/13</a:t>
             </a:fld>
             <a:endParaRPr lang="en-US"/>
           </a:p>
@@ -1520,7 +1520,7 @@
           <a:p>
             <a:fld id="{0EB034E8-5B5B-884E-9F8F-38FACABF36E5}" type="datetimeFigureOut">
               <a:rPr lang="en-US" smtClean="0"/>
-              <a:t>7/28/13</a:t>
+              <a:t>7/29/13</a:t>
             </a:fld>
             <a:endParaRPr lang="en-US"/>
           </a:p>
@@ -1700,7 +1700,7 @@
           <a:p>
             <a:fld id="{0EB034E8-5B5B-884E-9F8F-38FACABF36E5}" type="datetimeFigureOut">
               <a:rPr lang="en-US" smtClean="0"/>
-              <a:t>7/28/13</a:t>
+              <a:t>7/29/13</a:t>
             </a:fld>
             <a:endParaRPr lang="en-US"/>
           </a:p>
@@ -1819,7 +1819,7 @@
             <a:fld id="{AC189149-0EF4-49C1-99AA-A010A5AB3599}" type="datetimeFigureOut">
               <a:rPr lang="en-US" smtClean="0"/>
               <a:pPr/>
-              <a:t>7/28/13</a:t>
+              <a:t>7/29/13</a:t>
             </a:fld>
             <a:endParaRPr lang="en-US"/>
           </a:p>
@@ -1940,7 +1940,7 @@
                 <a:tabLst/>
                 <a:defRPr/>
               </a:pPr>
-              <a:t>7/28/13</a:t>
+              <a:t>7/29/13</a:t>
             </a:fld>
             <a:endParaRPr kumimoji="0" lang="en-US" sz="1200" b="0" i="0" u="none" strike="noStrike" kern="1200" cap="none" spc="0" normalizeH="0" baseline="0" noProof="0">
               <a:ln>
@@ -2321,7 +2321,7 @@
           <a:p>
             <a:fld id="{0EB034E8-5B5B-884E-9F8F-38FACABF36E5}" type="datetimeFigureOut">
               <a:rPr lang="en-US" smtClean="0"/>
-              <a:t>7/28/13</a:t>
+              <a:t>7/29/13</a:t>
             </a:fld>
             <a:endParaRPr lang="en-US"/>
           </a:p>
@@ -2567,7 +2567,7 @@
           <a:p>
             <a:fld id="{0EB034E8-5B5B-884E-9F8F-38FACABF36E5}" type="datetimeFigureOut">
               <a:rPr lang="en-US" smtClean="0"/>
-              <a:t>7/28/13</a:t>
+              <a:t>7/29/13</a:t>
             </a:fld>
             <a:endParaRPr lang="en-US"/>
           </a:p>
@@ -2855,7 +2855,7 @@
           <a:p>
             <a:fld id="{0EB034E8-5B5B-884E-9F8F-38FACABF36E5}" type="datetimeFigureOut">
               <a:rPr lang="en-US" smtClean="0"/>
-              <a:t>7/28/13</a:t>
+              <a:t>7/29/13</a:t>
             </a:fld>
             <a:endParaRPr lang="en-US"/>
           </a:p>
@@ -3277,7 +3277,7 @@
           <a:p>
             <a:fld id="{0EB034E8-5B5B-884E-9F8F-38FACABF36E5}" type="datetimeFigureOut">
               <a:rPr lang="en-US" smtClean="0"/>
-              <a:t>7/28/13</a:t>
+              <a:t>7/29/13</a:t>
             </a:fld>
             <a:endParaRPr lang="en-US"/>
           </a:p>
@@ -3395,7 +3395,7 @@
           <a:p>
             <a:fld id="{0EB034E8-5B5B-884E-9F8F-38FACABF36E5}" type="datetimeFigureOut">
               <a:rPr lang="en-US" smtClean="0"/>
-              <a:t>7/28/13</a:t>
+              <a:t>7/29/13</a:t>
             </a:fld>
             <a:endParaRPr lang="en-US"/>
           </a:p>
@@ -3490,7 +3490,7 @@
           <a:p>
             <a:fld id="{0EB034E8-5B5B-884E-9F8F-38FACABF36E5}" type="datetimeFigureOut">
               <a:rPr lang="en-US" smtClean="0"/>
-              <a:t>7/28/13</a:t>
+              <a:t>7/29/13</a:t>
             </a:fld>
             <a:endParaRPr lang="en-US"/>
           </a:p>
@@ -3767,7 +3767,7 @@
           <a:p>
             <a:fld id="{0EB034E8-5B5B-884E-9F8F-38FACABF36E5}" type="datetimeFigureOut">
               <a:rPr lang="en-US" smtClean="0"/>
-              <a:t>7/28/13</a:t>
+              <a:t>7/29/13</a:t>
             </a:fld>
             <a:endParaRPr lang="en-US"/>
           </a:p>
@@ -4020,7 +4020,7 @@
           <a:p>
             <a:fld id="{0EB034E8-5B5B-884E-9F8F-38FACABF36E5}" type="datetimeFigureOut">
               <a:rPr lang="en-US" smtClean="0"/>
-              <a:t>7/28/13</a:t>
+              <a:t>7/29/13</a:t>
             </a:fld>
             <a:endParaRPr lang="en-US"/>
           </a:p>
@@ -4233,7 +4233,7 @@
           <a:p>
             <a:fld id="{0EB034E8-5B5B-884E-9F8F-38FACABF36E5}" type="datetimeFigureOut">
               <a:rPr lang="en-US" smtClean="0"/>
-              <a:t>7/28/13</a:t>
+              <a:t>7/29/13</a:t>
             </a:fld>
             <a:endParaRPr lang="en-US"/>
           </a:p>
@@ -4891,7 +4891,7 @@
             <a:graphicData uri="http://schemas.openxmlformats.org/presentationml/2006/ole">
               <mc:AlternateContent xmlns:mc="http://schemas.openxmlformats.org/markup-compatibility/2006">
                 <mc:Choice xmlns:v="urn:schemas-microsoft-com:vml" Requires="v">
-                  <p:oleObj spid="_x0000_s1027" name="Image" r:id="rId10" imgW="2387302" imgH="2971429" progId="">
+                  <p:oleObj spid="_x0000_s1031" name="Image" r:id="rId10" imgW="2387302" imgH="2971429" progId="">
                     <p:embed/>
                   </p:oleObj>
                 </mc:Choice>
@@ -5301,6 +5301,13 @@
   <p:clrMapOvr>
     <a:masterClrMapping/>
   </p:clrMapOvr>
+  <p:timing>
+    <p:tnLst>
+      <p:par>
+        <p:cTn xmlns:p14="http://schemas.microsoft.com/office/powerpoint/2010/main" id="1" dur="indefinite" restart="never" nodeType="tmRoot"/>
+      </p:par>
+    </p:tnLst>
+  </p:timing>
 </p:sld>
 </file>
 
@@ -5630,6 +5637,13 @@
   <p:clrMapOvr>
     <a:masterClrMapping/>
   </p:clrMapOvr>
+  <p:timing>
+    <p:tnLst>
+      <p:par>
+        <p:cTn xmlns:p14="http://schemas.microsoft.com/office/powerpoint/2010/main" id="1" dur="indefinite" restart="never" nodeType="tmRoot"/>
+      </p:par>
+    </p:tnLst>
+  </p:timing>
 </p:sld>
 </file>
 
@@ -5688,6 +5702,13 @@
   <p:clrMapOvr>
     <a:masterClrMapping/>
   </p:clrMapOvr>
+  <p:timing>
+    <p:tnLst>
+      <p:par>
+        <p:cTn xmlns:p14="http://schemas.microsoft.com/office/powerpoint/2010/main" id="1" dur="indefinite" restart="never" nodeType="tmRoot"/>
+      </p:par>
+    </p:tnLst>
+  </p:timing>
 </p:sld>
 </file>
 
@@ -5908,6 +5929,13 @@
   <p:clrMapOvr>
     <a:masterClrMapping/>
   </p:clrMapOvr>
+  <p:timing>
+    <p:tnLst>
+      <p:par>
+        <p:cTn xmlns:p14="http://schemas.microsoft.com/office/powerpoint/2010/main" id="1" dur="indefinite" restart="never" nodeType="tmRoot"/>
+      </p:par>
+    </p:tnLst>
+  </p:timing>
 </p:sld>
 </file>
 
@@ -6235,6 +6263,13 @@
   <p:clrMapOvr>
     <a:masterClrMapping/>
   </p:clrMapOvr>
+  <p:timing>
+    <p:tnLst>
+      <p:par>
+        <p:cTn xmlns:p14="http://schemas.microsoft.com/office/powerpoint/2010/main" id="1" dur="indefinite" restart="never" nodeType="tmRoot"/>
+      </p:par>
+    </p:tnLst>
+  </p:timing>
 </p:sld>
 </file>
 
@@ -6550,6 +6585,13 @@
   <p:clrMapOvr>
     <a:masterClrMapping/>
   </p:clrMapOvr>
+  <p:timing>
+    <p:tnLst>
+      <p:par>
+        <p:cTn xmlns:p14="http://schemas.microsoft.com/office/powerpoint/2010/main" id="1" dur="indefinite" restart="never" nodeType="tmRoot"/>
+      </p:par>
+    </p:tnLst>
+  </p:timing>
 </p:sld>
 </file>
 
@@ -6784,6 +6826,13 @@
   <p:clrMapOvr>
     <a:masterClrMapping/>
   </p:clrMapOvr>
+  <p:timing>
+    <p:tnLst>
+      <p:par>
+        <p:cTn xmlns:p14="http://schemas.microsoft.com/office/powerpoint/2010/main" id="1" dur="indefinite" restart="never" nodeType="tmRoot"/>
+      </p:par>
+    </p:tnLst>
+  </p:timing>
 </p:sld>
 </file>
 
@@ -6989,6 +7038,13 @@
   <p:clrMapOvr>
     <a:masterClrMapping/>
   </p:clrMapOvr>
+  <p:timing>
+    <p:tnLst>
+      <p:par>
+        <p:cTn xmlns:p14="http://schemas.microsoft.com/office/powerpoint/2010/main" id="1" dur="indefinite" restart="never" nodeType="tmRoot"/>
+      </p:par>
+    </p:tnLst>
+  </p:timing>
 </p:sld>
 </file>
 
@@ -7208,6 +7264,13 @@
   <p:clrMapOvr>
     <a:masterClrMapping/>
   </p:clrMapOvr>
+  <p:timing>
+    <p:tnLst>
+      <p:par>
+        <p:cTn xmlns:p14="http://schemas.microsoft.com/office/powerpoint/2010/main" id="1" dur="indefinite" restart="never" nodeType="tmRoot"/>
+      </p:par>
+    </p:tnLst>
+  </p:timing>
 </p:sld>
 </file>
 
@@ -8114,6 +8177,13 @@
   <p:clrMapOvr>
     <a:masterClrMapping/>
   </p:clrMapOvr>
+  <p:timing>
+    <p:tnLst>
+      <p:par>
+        <p:cTn xmlns:p14="http://schemas.microsoft.com/office/powerpoint/2010/main" id="1" dur="indefinite" restart="never" nodeType="tmRoot"/>
+      </p:par>
+    </p:tnLst>
+  </p:timing>
 </p:sld>
 </file>
 
@@ -8635,6 +8705,13 @@
   <p:clrMapOvr>
     <a:masterClrMapping/>
   </p:clrMapOvr>
+  <p:timing>
+    <p:tnLst>
+      <p:par>
+        <p:cTn xmlns:p14="http://schemas.microsoft.com/office/powerpoint/2010/main" id="1" dur="indefinite" restart="never" nodeType="tmRoot"/>
+      </p:par>
+    </p:tnLst>
+  </p:timing>
 </p:sld>
 </file>
 
@@ -8898,6 +8975,13 @@
   <p:clrMapOvr>
     <a:masterClrMapping/>
   </p:clrMapOvr>
+  <p:timing>
+    <p:tnLst>
+      <p:par>
+        <p:cTn xmlns:p14="http://schemas.microsoft.com/office/powerpoint/2010/main" id="1" dur="indefinite" restart="never" nodeType="tmRoot"/>
+      </p:par>
+    </p:tnLst>
+  </p:timing>
 </p:sld>
 </file>
 
@@ -9076,6 +9160,13 @@
   <p:clrMapOvr>
     <a:masterClrMapping/>
   </p:clrMapOvr>
+  <p:timing>
+    <p:tnLst>
+      <p:par>
+        <p:cTn xmlns:p14="http://schemas.microsoft.com/office/powerpoint/2010/main" id="1" dur="indefinite" restart="never" nodeType="tmRoot"/>
+      </p:par>
+    </p:tnLst>
+  </p:timing>
 </p:sld>
 </file>
 
@@ -9439,6 +9530,13 @@
   <p:clrMapOvr>
     <a:masterClrMapping/>
   </p:clrMapOvr>
+  <p:timing>
+    <p:tnLst>
+      <p:par>
+        <p:cTn xmlns:p14="http://schemas.microsoft.com/office/powerpoint/2010/main" id="1" dur="indefinite" restart="never" nodeType="tmRoot"/>
+      </p:par>
+    </p:tnLst>
+  </p:timing>
 </p:sld>
 </file>
 
@@ -9855,6 +9953,13 @@
   <p:clrMapOvr>
     <a:masterClrMapping/>
   </p:clrMapOvr>
+  <p:timing>
+    <p:tnLst>
+      <p:par>
+        <p:cTn xmlns:p14="http://schemas.microsoft.com/office/powerpoint/2010/main" id="1" dur="indefinite" restart="never" nodeType="tmRoot"/>
+      </p:par>
+    </p:tnLst>
+  </p:timing>
 </p:sld>
 </file>
 
@@ -10016,6 +10121,13 @@
   <p:clrMapOvr>
     <a:masterClrMapping/>
   </p:clrMapOvr>
+  <p:timing>
+    <p:tnLst>
+      <p:par>
+        <p:cTn xmlns:p14="http://schemas.microsoft.com/office/powerpoint/2010/main" id="1" dur="indefinite" restart="never" nodeType="tmRoot"/>
+      </p:par>
+    </p:tnLst>
+  </p:timing>
 </p:sld>
 </file>
 
@@ -10235,6 +10347,13 @@
   <p:clrMapOvr>
     <a:masterClrMapping/>
   </p:clrMapOvr>
+  <p:timing>
+    <p:tnLst>
+      <p:par>
+        <p:cTn xmlns:p14="http://schemas.microsoft.com/office/powerpoint/2010/main" id="1" dur="indefinite" restart="never" nodeType="tmRoot"/>
+      </p:par>
+    </p:tnLst>
+  </p:timing>
 </p:sld>
 </file>
 
@@ -10366,6 +10485,13 @@
   <p:clrMapOvr>
     <a:masterClrMapping/>
   </p:clrMapOvr>
+  <p:timing>
+    <p:tnLst>
+      <p:par>
+        <p:cTn xmlns:p14="http://schemas.microsoft.com/office/powerpoint/2010/main" id="1" dur="indefinite" restart="never" nodeType="tmRoot"/>
+      </p:par>
+    </p:tnLst>
+  </p:timing>
 </p:sld>
 </file>
 
@@ -10409,17 +10535,7 @@
                   </a:schemeClr>
                 </a:solidFill>
               </a:rPr>
-              <a:t>Quality </a:t>
-            </a:r>
-            <a:r>
-              <a:rPr lang="en-US" b="1" dirty="0" smtClean="0">
-                <a:solidFill>
-                  <a:schemeClr val="tx2">
-                    <a:lumMod val="75000"/>
-                  </a:schemeClr>
-                </a:solidFill>
-              </a:rPr>
-              <a:t>logical expressions</a:t>
+              <a:t>Quality logical expressions</a:t>
             </a:r>
             <a:endParaRPr lang="en-US" b="1" dirty="0">
               <a:solidFill>
@@ -10554,6 +10670,13 @@
   <p:clrMapOvr>
     <a:masterClrMapping/>
   </p:clrMapOvr>
+  <p:timing>
+    <p:tnLst>
+      <p:par>
+        <p:cTn xmlns:p14="http://schemas.microsoft.com/office/powerpoint/2010/main" id="1" dur="indefinite" restart="never" nodeType="tmRoot"/>
+      </p:par>
+    </p:tnLst>
+  </p:timing>
 </p:sld>
 </file>
 
@@ -10597,17 +10720,7 @@
                   </a:schemeClr>
                 </a:solidFill>
               </a:rPr>
-              <a:t>Ontology </a:t>
-            </a:r>
-            <a:r>
-              <a:rPr lang="en-US" b="1" dirty="0" smtClean="0">
-                <a:solidFill>
-                  <a:schemeClr val="tx2">
-                    <a:lumMod val="75000"/>
-                  </a:schemeClr>
-                </a:solidFill>
-              </a:rPr>
-              <a:t>reuse</a:t>
+              <a:t>Ontology reuse</a:t>
             </a:r>
             <a:endParaRPr lang="en-US" b="1" dirty="0">
               <a:solidFill>
@@ -10691,6 +10804,13 @@
   <p:clrMapOvr>
     <a:masterClrMapping/>
   </p:clrMapOvr>
+  <p:timing>
+    <p:tnLst>
+      <p:par>
+        <p:cTn xmlns:p14="http://schemas.microsoft.com/office/powerpoint/2010/main" id="1" dur="indefinite" restart="never" nodeType="tmRoot"/>
+      </p:par>
+    </p:tnLst>
+  </p:timing>
 </p:sld>
 </file>
 
@@ -10992,6 +11112,13 @@
   <p:clrMapOvr>
     <a:masterClrMapping/>
   </p:clrMapOvr>
+  <p:timing>
+    <p:tnLst>
+      <p:par>
+        <p:cTn xmlns:p14="http://schemas.microsoft.com/office/powerpoint/2010/main" id="1" dur="indefinite" restart="never" nodeType="tmRoot"/>
+      </p:par>
+    </p:tnLst>
+  </p:timing>
 </p:sld>
 </file>
 
@@ -11101,6 +11228,13 @@
   <p:clrMapOvr>
     <a:masterClrMapping/>
   </p:clrMapOvr>
+  <p:timing>
+    <p:tnLst>
+      <p:par>
+        <p:cTn xmlns:p14="http://schemas.microsoft.com/office/powerpoint/2010/main" id="1" dur="indefinite" restart="never" nodeType="tmRoot"/>
+      </p:par>
+    </p:tnLst>
+  </p:timing>
 </p:sld>
 </file>
 
@@ -11854,6 +11988,13 @@
   <p:clrMapOvr>
     <a:masterClrMapping/>
   </p:clrMapOvr>
+  <p:timing>
+    <p:tnLst>
+      <p:par>
+        <p:cTn xmlns:p14="http://schemas.microsoft.com/office/powerpoint/2010/main" id="1" dur="indefinite" restart="never" nodeType="tmRoot"/>
+      </p:par>
+    </p:tnLst>
+  </p:timing>
 </p:sld>
 </file>
 
@@ -12025,6 +12166,13 @@
   <p:clrMapOvr>
     <a:masterClrMapping/>
   </p:clrMapOvr>
+  <p:timing>
+    <p:tnLst>
+      <p:par>
+        <p:cTn xmlns:p14="http://schemas.microsoft.com/office/powerpoint/2010/main" id="1" dur="indefinite" restart="never" nodeType="tmRoot"/>
+      </p:par>
+    </p:tnLst>
+  </p:timing>
 </p:sld>
 </file>
 
@@ -12433,6 +12581,13 @@
   <p:clrMapOvr>
     <a:masterClrMapping/>
   </p:clrMapOvr>
+  <p:timing>
+    <p:tnLst>
+      <p:par>
+        <p:cTn xmlns:p14="http://schemas.microsoft.com/office/powerpoint/2010/main" id="1" dur="indefinite" restart="never" nodeType="tmRoot"/>
+      </p:par>
+    </p:tnLst>
+  </p:timing>
 </p:sld>
 </file>
 
@@ -13485,6 +13640,13 @@
   <p:clrMapOvr>
     <a:masterClrMapping/>
   </p:clrMapOvr>
+  <p:timing>
+    <p:tnLst>
+      <p:par>
+        <p:cTn xmlns:p14="http://schemas.microsoft.com/office/powerpoint/2010/main" id="1" dur="indefinite" restart="never" nodeType="tmRoot"/>
+      </p:par>
+    </p:tnLst>
+  </p:timing>
 </p:sld>
 </file>
 
@@ -14098,6 +14260,13 @@
   <p:clrMapOvr>
     <a:masterClrMapping/>
   </p:clrMapOvr>
+  <p:timing>
+    <p:tnLst>
+      <p:par>
+        <p:cTn xmlns:p14="http://schemas.microsoft.com/office/powerpoint/2010/main" id="1" dur="indefinite" restart="never" nodeType="tmRoot"/>
+      </p:par>
+    </p:tnLst>
+  </p:timing>
 </p:sld>
 </file>
 
@@ -14275,7 +14444,7 @@
         <p:spPr>
           <a:xfrm>
             <a:off x="4645025" y="1306512"/>
-            <a:ext cx="4041775" cy="1284288"/>
+            <a:ext cx="4041775" cy="3014519"/>
           </a:xfrm>
           <a:ln>
             <a:solidFill>
@@ -14285,7 +14454,7 @@
         </p:spPr>
         <p:txBody>
           <a:bodyPr>
-            <a:normAutofit/>
+            <a:normAutofit lnSpcReduction="10000"/>
           </a:bodyPr>
           <a:lstStyle/>
           <a:p>
@@ -14293,9 +14462,34 @@
               <a:buNone/>
             </a:pPr>
             <a:r>
+              <a:rPr lang="en-US" dirty="0" smtClean="0"/>
+              <a:t>Textual </a:t>
+            </a:r>
+            <a:r>
               <a:rPr lang="en-US" dirty="0"/>
-              <a:t>The ontology provider has procedures for identifying distinct successive versions</a:t>
-            </a:r>
+              <a:t>definitions </a:t>
+            </a:r>
+            <a:r>
+              <a:rPr lang="en-US" dirty="0" smtClean="0"/>
+              <a:t>for </a:t>
+            </a:r>
+            <a:r>
+              <a:rPr lang="en-US" dirty="0"/>
+              <a:t>a substantial and representative </a:t>
+            </a:r>
+            <a:r>
+              <a:rPr lang="en-US" dirty="0" smtClean="0"/>
+              <a:t>fraction. </a:t>
+            </a:r>
+            <a:r>
+              <a:rPr lang="en-US" dirty="0"/>
+              <a:t>For terms lacking textual definitions, there should be evidence of implementation of a strategy to provide definitions for all remaining undefined terms</a:t>
+            </a:r>
+            <a:r>
+              <a:rPr lang="en-US" dirty="0" smtClean="0"/>
+              <a:t>.</a:t>
+            </a:r>
+            <a:endParaRPr lang="en-US" dirty="0"/>
           </a:p>
         </p:txBody>
       </p:sp>
@@ -14663,6 +14857,13 @@
   <p:clrMapOvr>
     <a:masterClrMapping/>
   </p:clrMapOvr>
+  <p:timing>
+    <p:tnLst>
+      <p:par>
+        <p:cTn xmlns:p14="http://schemas.microsoft.com/office/powerpoint/2010/main" id="1" dur="indefinite" restart="never" nodeType="tmRoot"/>
+      </p:par>
+    </p:tnLst>
+  </p:timing>
 </p:sld>
 </file>
 
@@ -14813,7 +15014,7 @@
         </p:spPr>
         <p:txBody>
           <a:bodyPr>
-            <a:normAutofit/>
+            <a:normAutofit fontScale="77500" lnSpcReduction="20000"/>
           </a:bodyPr>
           <a:lstStyle/>
           <a:p>
@@ -14821,9 +15022,46 @@
               <a:buNone/>
             </a:pPr>
             <a:r>
+              <a:rPr lang="en-US" dirty="0" smtClean="0"/>
+              <a:t>It </a:t>
+            </a:r>
+            <a:r>
               <a:rPr lang="en-US" dirty="0"/>
-              <a:t>The ontology provider has procedures for identifying distinct successive versions</a:t>
-            </a:r>
+              <a:t>is assumed that OBO Foundry ontology </a:t>
+            </a:r>
+            <a:r>
+              <a:rPr lang="en-US" dirty="0" err="1" smtClean="0"/>
+              <a:t>developmentis</a:t>
+            </a:r>
+            <a:r>
+              <a:rPr lang="en-US" dirty="0" smtClean="0"/>
+              <a:t> </a:t>
+            </a:r>
+            <a:r>
+              <a:rPr lang="en-US" dirty="0"/>
+              <a:t>carried out in a collaborative </a:t>
+            </a:r>
+            <a:r>
+              <a:rPr lang="en-US" dirty="0" smtClean="0"/>
+              <a:t>fashion and maintained </a:t>
+            </a:r>
+            <a:r>
+              <a:rPr lang="en-US" dirty="0"/>
+              <a:t>in </a:t>
+            </a:r>
+            <a:r>
+              <a:rPr lang="en-US" dirty="0" smtClean="0"/>
+              <a:t>to </a:t>
+            </a:r>
+            <a:r>
+              <a:rPr lang="en-US" dirty="0"/>
+              <a:t>ensure consistency with neighboring OBO Foundry </a:t>
+            </a:r>
+            <a:r>
+              <a:rPr lang="en-US" dirty="0" smtClean="0"/>
+              <a:t>ontologies.</a:t>
+            </a:r>
+            <a:endParaRPr lang="en-US" dirty="0"/>
           </a:p>
         </p:txBody>
       </p:sp>
@@ -15579,6 +15817,13 @@
   <p:clrMapOvr>
     <a:masterClrMapping/>
   </p:clrMapOvr>
+  <p:timing>
+    <p:tnLst>
+      <p:par>
+        <p:cTn xmlns:p14="http://schemas.microsoft.com/office/powerpoint/2010/main" id="1" dur="indefinite" restart="never" nodeType="tmRoot"/>
+      </p:par>
+    </p:tnLst>
+  </p:timing>
 </p:sld>
 </file>
 
@@ -16469,6 +16714,13 @@
   <p:clrMapOvr>
     <a:masterClrMapping/>
   </p:clrMapOvr>
+  <p:timing>
+    <p:tnLst>
+      <p:par>
+        <p:cTn xmlns:p14="http://schemas.microsoft.com/office/powerpoint/2010/main" id="1" dur="indefinite" restart="never" nodeType="tmRoot"/>
+      </p:par>
+    </p:tnLst>
+  </p:timing>
 </p:sld>
 </file>
 

</xml_diff>